<commit_message>
Clase 12 - MAT Aplicada
</commit_message>
<xml_diff>
--- a/Semestre 2/Matematicas Aplicadas/Apuntes/2. Sucesiones.pptx
+++ b/Semestre 2/Matematicas Aplicadas/Apuntes/2. Sucesiones.pptx
@@ -7,24 +7,27 @@
   <p:sldIdLst>
     <p:sldId id="280" r:id="rId2"/>
     <p:sldId id="290" r:id="rId3"/>
-    <p:sldId id="276" r:id="rId4"/>
-    <p:sldId id="263" r:id="rId5"/>
-    <p:sldId id="262" r:id="rId6"/>
-    <p:sldId id="264" r:id="rId7"/>
-    <p:sldId id="260" r:id="rId8"/>
-    <p:sldId id="279" r:id="rId9"/>
-    <p:sldId id="258" r:id="rId10"/>
-    <p:sldId id="256" r:id="rId11"/>
-    <p:sldId id="259" r:id="rId12"/>
-    <p:sldId id="257" r:id="rId13"/>
-    <p:sldId id="274" r:id="rId14"/>
-    <p:sldId id="273" r:id="rId15"/>
-    <p:sldId id="271" r:id="rId16"/>
-    <p:sldId id="289" r:id="rId17"/>
-    <p:sldId id="275" r:id="rId18"/>
-    <p:sldId id="281" r:id="rId19"/>
-    <p:sldId id="282" r:id="rId20"/>
-    <p:sldId id="283" r:id="rId21"/>
+    <p:sldId id="291" r:id="rId4"/>
+    <p:sldId id="276" r:id="rId5"/>
+    <p:sldId id="263" r:id="rId6"/>
+    <p:sldId id="262" r:id="rId7"/>
+    <p:sldId id="264" r:id="rId8"/>
+    <p:sldId id="260" r:id="rId9"/>
+    <p:sldId id="279" r:id="rId10"/>
+    <p:sldId id="258" r:id="rId11"/>
+    <p:sldId id="256" r:id="rId12"/>
+    <p:sldId id="259" r:id="rId13"/>
+    <p:sldId id="257" r:id="rId14"/>
+    <p:sldId id="274" r:id="rId15"/>
+    <p:sldId id="273" r:id="rId16"/>
+    <p:sldId id="271" r:id="rId17"/>
+    <p:sldId id="289" r:id="rId18"/>
+    <p:sldId id="275" r:id="rId19"/>
+    <p:sldId id="281" r:id="rId20"/>
+    <p:sldId id="282" r:id="rId21"/>
+    <p:sldId id="283" r:id="rId22"/>
+    <p:sldId id="293" r:id="rId23"/>
+    <p:sldId id="292" r:id="rId24"/>
   </p:sldIdLst>
   <p:sldSz cx="12192000" cy="6858000"/>
   <p:notesSz cx="6858000" cy="9144000"/>
@@ -270,7 +273,7 @@
           <a:p>
             <a:fld id="{F799E091-9680-4866-BAFD-0F7832C10B00}" type="datetimeFigureOut">
               <a:rPr lang="es-CL" smtClean="0"/>
-              <a:t>07-10-2024</a:t>
+              <a:t>11-10-2024</a:t>
             </a:fld>
             <a:endParaRPr lang="es-CL"/>
           </a:p>
@@ -448,7 +451,7 @@
           <a:p>
             <a:fld id="{F799E091-9680-4866-BAFD-0F7832C10B00}" type="datetimeFigureOut">
               <a:rPr lang="es-CL" smtClean="0"/>
-              <a:t>07-10-2024</a:t>
+              <a:t>11-10-2024</a:t>
             </a:fld>
             <a:endParaRPr lang="es-CL"/>
           </a:p>
@@ -636,7 +639,7 @@
           <a:p>
             <a:fld id="{F799E091-9680-4866-BAFD-0F7832C10B00}" type="datetimeFigureOut">
               <a:rPr lang="es-CL" smtClean="0"/>
-              <a:t>07-10-2024</a:t>
+              <a:t>11-10-2024</a:t>
             </a:fld>
             <a:endParaRPr lang="es-CL"/>
           </a:p>
@@ -814,7 +817,7 @@
           <a:p>
             <a:fld id="{F799E091-9680-4866-BAFD-0F7832C10B00}" type="datetimeFigureOut">
               <a:rPr lang="es-CL" smtClean="0"/>
-              <a:t>07-10-2024</a:t>
+              <a:t>11-10-2024</a:t>
             </a:fld>
             <a:endParaRPr lang="es-CL"/>
           </a:p>
@@ -1068,7 +1071,7 @@
           <a:p>
             <a:fld id="{F799E091-9680-4866-BAFD-0F7832C10B00}" type="datetimeFigureOut">
               <a:rPr lang="es-CL" smtClean="0"/>
-              <a:t>07-10-2024</a:t>
+              <a:t>11-10-2024</a:t>
             </a:fld>
             <a:endParaRPr lang="es-CL"/>
           </a:p>
@@ -1308,7 +1311,7 @@
           <a:p>
             <a:fld id="{F799E091-9680-4866-BAFD-0F7832C10B00}" type="datetimeFigureOut">
               <a:rPr lang="es-CL" smtClean="0"/>
-              <a:t>07-10-2024</a:t>
+              <a:t>11-10-2024</a:t>
             </a:fld>
             <a:endParaRPr lang="es-CL"/>
           </a:p>
@@ -1683,7 +1686,7 @@
           <a:p>
             <a:fld id="{F799E091-9680-4866-BAFD-0F7832C10B00}" type="datetimeFigureOut">
               <a:rPr lang="es-CL" smtClean="0"/>
-              <a:t>07-10-2024</a:t>
+              <a:t>11-10-2024</a:t>
             </a:fld>
             <a:endParaRPr lang="es-CL"/>
           </a:p>
@@ -2246,7 +2249,7 @@
           <a:p>
             <a:fld id="{F799E091-9680-4866-BAFD-0F7832C10B00}" type="datetimeFigureOut">
               <a:rPr lang="es-CL" smtClean="0"/>
-              <a:t>07-10-2024</a:t>
+              <a:t>11-10-2024</a:t>
             </a:fld>
             <a:endParaRPr lang="es-CL"/>
           </a:p>
@@ -2507,7 +2510,7 @@
           <a:p>
             <a:fld id="{F799E091-9680-4866-BAFD-0F7832C10B00}" type="datetimeFigureOut">
               <a:rPr lang="es-CL" smtClean="0"/>
-              <a:t>07-10-2024</a:t>
+              <a:t>11-10-2024</a:t>
             </a:fld>
             <a:endParaRPr lang="es-CL"/>
           </a:p>
@@ -3302,6 +3305,96 @@
           <p:cNvPr id="2" name="Imagen 1">
             <a:extLst>
               <a:ext uri="{FF2B5EF4-FFF2-40B4-BE49-F238E27FC236}">
+                <a16:creationId xmlns:a16="http://schemas.microsoft.com/office/drawing/2014/main" id="{7F38A179-1591-4BF0-B4D9-498F3C85FA32}"/>
+              </a:ext>
+            </a:extLst>
+          </p:cNvPr>
+          <p:cNvPicPr>
+            <a:picLocks noChangeAspect="1"/>
+          </p:cNvPicPr>
+          <p:nvPr/>
+        </p:nvPicPr>
+        <p:blipFill>
+          <a:blip r:embed="rId3"/>
+          <a:stretch>
+            <a:fillRect/>
+          </a:stretch>
+        </p:blipFill>
+        <p:spPr>
+          <a:xfrm>
+            <a:off x="1937757" y="1561839"/>
+            <a:ext cx="8316486" cy="3734321"/>
+          </a:xfrm>
+          <a:prstGeom prst="rect">
+            <a:avLst/>
+          </a:prstGeom>
+        </p:spPr>
+      </p:pic>
+    </p:spTree>
+    <p:extLst>
+      <p:ext uri="{BB962C8B-B14F-4D97-AF65-F5344CB8AC3E}">
+        <p14:creationId xmlns:p14="http://schemas.microsoft.com/office/powerpoint/2010/main" val="2670592745"/>
+      </p:ext>
+    </p:extLst>
+  </p:cSld>
+  <p:clrMapOvr>
+    <a:overrideClrMapping bg1="lt1" tx1="dk1" bg2="lt2" tx2="dk2" accent1="accent1" accent2="accent2" accent3="accent3" accent4="accent4" accent5="accent5" accent6="accent6" hlink="hlink" folHlink="folHlink"/>
+  </p:clrMapOvr>
+</p:sld>
+</file>
+
+<file path=ppt/slides/slide11.xml><?xml version="1.0" encoding="utf-8"?>
+<p:sld xmlns:a="http://schemas.openxmlformats.org/drawingml/2006/main" xmlns:r="http://schemas.openxmlformats.org/officeDocument/2006/relationships" xmlns:p="http://schemas.openxmlformats.org/presentationml/2006/main">
+  <p:cSld>
+    <p:bg>
+      <p:bgPr>
+        <a:gradFill flip="none" rotWithShape="1">
+          <a:gsLst>
+            <a:gs pos="0">
+              <a:schemeClr val="accent4">
+                <a:lumMod val="0"/>
+                <a:lumOff val="100000"/>
+              </a:schemeClr>
+            </a:gs>
+            <a:gs pos="35000">
+              <a:schemeClr val="accent4">
+                <a:lumMod val="0"/>
+                <a:lumOff val="100000"/>
+              </a:schemeClr>
+            </a:gs>
+            <a:gs pos="100000">
+              <a:schemeClr val="accent4">
+                <a:lumMod val="100000"/>
+              </a:schemeClr>
+            </a:gs>
+          </a:gsLst>
+          <a:path path="circle">
+            <a:fillToRect l="50000" t="-80000" r="50000" b="180000"/>
+          </a:path>
+          <a:tileRect/>
+        </a:gradFill>
+        <a:effectLst/>
+      </p:bgPr>
+    </p:bg>
+    <p:spTree>
+      <p:nvGrpSpPr>
+        <p:cNvPr id="1" name=""/>
+        <p:cNvGrpSpPr/>
+        <p:nvPr/>
+      </p:nvGrpSpPr>
+      <p:grpSpPr>
+        <a:xfrm>
+          <a:off x="0" y="0"/>
+          <a:ext cx="0" cy="0"/>
+          <a:chOff x="0" y="0"/>
+          <a:chExt cx="0" cy="0"/>
+        </a:xfrm>
+      </p:grpSpPr>
+      <p:pic>
+        <p:nvPicPr>
+          <p:cNvPr id="2" name="Imagen 1">
+            <a:extLst>
+              <a:ext uri="{FF2B5EF4-FFF2-40B4-BE49-F238E27FC236}">
                 <a16:creationId xmlns:a16="http://schemas.microsoft.com/office/drawing/2014/main" id="{DC0E2C06-D72E-4856-9C82-84D7FA5B9473}"/>
               </a:ext>
             </a:extLst>
@@ -3340,7 +3433,7 @@
 </p:sld>
 </file>
 
-<file path=ppt/slides/slide11.xml><?xml version="1.0" encoding="utf-8"?>
+<file path=ppt/slides/slide12.xml><?xml version="1.0" encoding="utf-8"?>
 <p:sld xmlns:a="http://schemas.openxmlformats.org/drawingml/2006/main" xmlns:r="http://schemas.openxmlformats.org/officeDocument/2006/relationships" xmlns:p="http://schemas.openxmlformats.org/presentationml/2006/main">
   <p:cSld>
     <p:bg>
@@ -3430,7 +3523,7 @@
 </p:sld>
 </file>
 
-<file path=ppt/slides/slide12.xml><?xml version="1.0" encoding="utf-8"?>
+<file path=ppt/slides/slide13.xml><?xml version="1.0" encoding="utf-8"?>
 <p:sld xmlns:a="http://schemas.openxmlformats.org/drawingml/2006/main" xmlns:r="http://schemas.openxmlformats.org/officeDocument/2006/relationships" xmlns:p="http://schemas.openxmlformats.org/presentationml/2006/main">
   <p:cSld>
     <p:bg>
@@ -3550,7 +3643,7 @@
 </p:sld>
 </file>
 
-<file path=ppt/slides/slide13.xml><?xml version="1.0" encoding="utf-8"?>
+<file path=ppt/slides/slide14.xml><?xml version="1.0" encoding="utf-8"?>
 <p:sld xmlns:a="http://schemas.openxmlformats.org/drawingml/2006/main" xmlns:r="http://schemas.openxmlformats.org/officeDocument/2006/relationships" xmlns:p="http://schemas.openxmlformats.org/presentationml/2006/main">
   <p:cSld>
     <p:bg>
@@ -3700,7 +3793,7 @@
 </p:sld>
 </file>
 
-<file path=ppt/slides/slide14.xml><?xml version="1.0" encoding="utf-8"?>
+<file path=ppt/slides/slide15.xml><?xml version="1.0" encoding="utf-8"?>
 <p:sld xmlns:a="http://schemas.openxmlformats.org/drawingml/2006/main" xmlns:r="http://schemas.openxmlformats.org/officeDocument/2006/relationships" xmlns:p="http://schemas.openxmlformats.org/presentationml/2006/main">
   <p:cSld>
     <p:bg>
@@ -3790,7 +3883,7 @@
 </p:sld>
 </file>
 
-<file path=ppt/slides/slide15.xml><?xml version="1.0" encoding="utf-8"?>
+<file path=ppt/slides/slide16.xml><?xml version="1.0" encoding="utf-8"?>
 <p:sld xmlns:a="http://schemas.openxmlformats.org/drawingml/2006/main" xmlns:r="http://schemas.openxmlformats.org/officeDocument/2006/relationships" xmlns:p="http://schemas.openxmlformats.org/presentationml/2006/main">
   <p:cSld>
     <p:bg>
@@ -3910,7 +4003,7 @@
 </p:sld>
 </file>
 
-<file path=ppt/slides/slide16.xml><?xml version="1.0" encoding="utf-8"?>
+<file path=ppt/slides/slide17.xml><?xml version="1.0" encoding="utf-8"?>
 <p:sld xmlns:a="http://schemas.openxmlformats.org/drawingml/2006/main" xmlns:r="http://schemas.openxmlformats.org/officeDocument/2006/relationships" xmlns:p="http://schemas.openxmlformats.org/presentationml/2006/main">
   <p:cSld>
     <p:spTree>
@@ -3970,7 +4063,7 @@
 </p:sld>
 </file>
 
-<file path=ppt/slides/slide17.xml><?xml version="1.0" encoding="utf-8"?>
+<file path=ppt/slides/slide18.xml><?xml version="1.0" encoding="utf-8"?>
 <p:sld xmlns:a="http://schemas.openxmlformats.org/drawingml/2006/main" xmlns:r="http://schemas.openxmlformats.org/officeDocument/2006/relationships" xmlns:p="http://schemas.openxmlformats.org/presentationml/2006/main">
   <p:cSld>
     <p:bg>
@@ -4090,7 +4183,7 @@
 </p:sld>
 </file>
 
-<file path=ppt/slides/slide18.xml><?xml version="1.0" encoding="utf-8"?>
+<file path=ppt/slides/slide19.xml><?xml version="1.0" encoding="utf-8"?>
 <p:sld xmlns:a="http://schemas.openxmlformats.org/drawingml/2006/main" xmlns:r="http://schemas.openxmlformats.org/officeDocument/2006/relationships" xmlns:p="http://schemas.openxmlformats.org/presentationml/2006/main">
   <p:cSld>
     <p:spTree>
@@ -4201,96 +4294,6 @@
     <p:extLst>
       <p:ext uri="{BB962C8B-B14F-4D97-AF65-F5344CB8AC3E}">
         <p14:creationId xmlns:p14="http://schemas.microsoft.com/office/powerpoint/2010/main" val="1692826818"/>
-      </p:ext>
-    </p:extLst>
-  </p:cSld>
-  <p:clrMapOvr>
-    <a:masterClrMapping/>
-  </p:clrMapOvr>
-</p:sld>
-</file>
-
-<file path=ppt/slides/slide19.xml><?xml version="1.0" encoding="utf-8"?>
-<p:sld xmlns:a="http://schemas.openxmlformats.org/drawingml/2006/main" xmlns:r="http://schemas.openxmlformats.org/officeDocument/2006/relationships" xmlns:p="http://schemas.openxmlformats.org/presentationml/2006/main">
-  <p:cSld>
-    <p:spTree>
-      <p:nvGrpSpPr>
-        <p:cNvPr id="1" name=""/>
-        <p:cNvGrpSpPr/>
-        <p:nvPr/>
-      </p:nvGrpSpPr>
-      <p:grpSpPr>
-        <a:xfrm>
-          <a:off x="0" y="0"/>
-          <a:ext cx="0" cy="0"/>
-          <a:chOff x="0" y="0"/>
-          <a:chExt cx="0" cy="0"/>
-        </a:xfrm>
-      </p:grpSpPr>
-      <p:pic>
-        <p:nvPicPr>
-          <p:cNvPr id="2" name="Imagen 1">
-            <a:extLst>
-              <a:ext uri="{FF2B5EF4-FFF2-40B4-BE49-F238E27FC236}">
-                <a16:creationId xmlns:a16="http://schemas.microsoft.com/office/drawing/2014/main" id="{D76B1541-6033-4F42-B242-8E5138898770}"/>
-              </a:ext>
-            </a:extLst>
-          </p:cNvPr>
-          <p:cNvPicPr>
-            <a:picLocks noChangeAspect="1"/>
-          </p:cNvPicPr>
-          <p:nvPr/>
-        </p:nvPicPr>
-        <p:blipFill>
-          <a:blip r:embed="rId2"/>
-          <a:stretch>
-            <a:fillRect/>
-          </a:stretch>
-        </p:blipFill>
-        <p:spPr>
-          <a:xfrm>
-            <a:off x="207515" y="164333"/>
-            <a:ext cx="8154538" cy="3667637"/>
-          </a:xfrm>
-          <a:prstGeom prst="rect">
-            <a:avLst/>
-          </a:prstGeom>
-        </p:spPr>
-      </p:pic>
-      <p:pic>
-        <p:nvPicPr>
-          <p:cNvPr id="3" name="Imagen 2">
-            <a:extLst>
-              <a:ext uri="{FF2B5EF4-FFF2-40B4-BE49-F238E27FC236}">
-                <a16:creationId xmlns:a16="http://schemas.microsoft.com/office/drawing/2014/main" id="{36E38AF1-49E1-457A-8C67-0A0B0B9DDEBB}"/>
-              </a:ext>
-            </a:extLst>
-          </p:cNvPr>
-          <p:cNvPicPr>
-            <a:picLocks noChangeAspect="1"/>
-          </p:cNvPicPr>
-          <p:nvPr/>
-        </p:nvPicPr>
-        <p:blipFill>
-          <a:blip r:embed="rId3"/>
-          <a:stretch>
-            <a:fillRect/>
-          </a:stretch>
-        </p:blipFill>
-        <p:spPr>
-          <a:xfrm>
-            <a:off x="8526427" y="164333"/>
-            <a:ext cx="3458058" cy="2238687"/>
-          </a:xfrm>
-          <a:prstGeom prst="rect">
-            <a:avLst/>
-          </a:prstGeom>
-        </p:spPr>
-      </p:pic>
-    </p:spTree>
-    <p:extLst>
-      <p:ext uri="{BB962C8B-B14F-4D97-AF65-F5344CB8AC3E}">
-        <p14:creationId xmlns:p14="http://schemas.microsoft.com/office/powerpoint/2010/main" val="801915407"/>
       </p:ext>
     </p:extLst>
   </p:cSld>
@@ -4481,6 +4484,96 @@
           <p:cNvPr id="2" name="Imagen 1">
             <a:extLst>
               <a:ext uri="{FF2B5EF4-FFF2-40B4-BE49-F238E27FC236}">
+                <a16:creationId xmlns:a16="http://schemas.microsoft.com/office/drawing/2014/main" id="{D76B1541-6033-4F42-B242-8E5138898770}"/>
+              </a:ext>
+            </a:extLst>
+          </p:cNvPr>
+          <p:cNvPicPr>
+            <a:picLocks noChangeAspect="1"/>
+          </p:cNvPicPr>
+          <p:nvPr/>
+        </p:nvPicPr>
+        <p:blipFill>
+          <a:blip r:embed="rId2"/>
+          <a:stretch>
+            <a:fillRect/>
+          </a:stretch>
+        </p:blipFill>
+        <p:spPr>
+          <a:xfrm>
+            <a:off x="207515" y="164333"/>
+            <a:ext cx="8154538" cy="3667637"/>
+          </a:xfrm>
+          <a:prstGeom prst="rect">
+            <a:avLst/>
+          </a:prstGeom>
+        </p:spPr>
+      </p:pic>
+      <p:pic>
+        <p:nvPicPr>
+          <p:cNvPr id="3" name="Imagen 2">
+            <a:extLst>
+              <a:ext uri="{FF2B5EF4-FFF2-40B4-BE49-F238E27FC236}">
+                <a16:creationId xmlns:a16="http://schemas.microsoft.com/office/drawing/2014/main" id="{36E38AF1-49E1-457A-8C67-0A0B0B9DDEBB}"/>
+              </a:ext>
+            </a:extLst>
+          </p:cNvPr>
+          <p:cNvPicPr>
+            <a:picLocks noChangeAspect="1"/>
+          </p:cNvPicPr>
+          <p:nvPr/>
+        </p:nvPicPr>
+        <p:blipFill>
+          <a:blip r:embed="rId3"/>
+          <a:stretch>
+            <a:fillRect/>
+          </a:stretch>
+        </p:blipFill>
+        <p:spPr>
+          <a:xfrm>
+            <a:off x="8526427" y="164333"/>
+            <a:ext cx="3458058" cy="2238687"/>
+          </a:xfrm>
+          <a:prstGeom prst="rect">
+            <a:avLst/>
+          </a:prstGeom>
+        </p:spPr>
+      </p:pic>
+    </p:spTree>
+    <p:extLst>
+      <p:ext uri="{BB962C8B-B14F-4D97-AF65-F5344CB8AC3E}">
+        <p14:creationId xmlns:p14="http://schemas.microsoft.com/office/powerpoint/2010/main" val="801915407"/>
+      </p:ext>
+    </p:extLst>
+  </p:cSld>
+  <p:clrMapOvr>
+    <a:masterClrMapping/>
+  </p:clrMapOvr>
+</p:sld>
+</file>
+
+<file path=ppt/slides/slide21.xml><?xml version="1.0" encoding="utf-8"?>
+<p:sld xmlns:a="http://schemas.openxmlformats.org/drawingml/2006/main" xmlns:r="http://schemas.openxmlformats.org/officeDocument/2006/relationships" xmlns:p="http://schemas.openxmlformats.org/presentationml/2006/main">
+  <p:cSld>
+    <p:spTree>
+      <p:nvGrpSpPr>
+        <p:cNvPr id="1" name=""/>
+        <p:cNvGrpSpPr/>
+        <p:nvPr/>
+      </p:nvGrpSpPr>
+      <p:grpSpPr>
+        <a:xfrm>
+          <a:off x="0" y="0"/>
+          <a:ext cx="0" cy="0"/>
+          <a:chOff x="0" y="0"/>
+          <a:chExt cx="0" cy="0"/>
+        </a:xfrm>
+      </p:grpSpPr>
+      <p:pic>
+        <p:nvPicPr>
+          <p:cNvPr id="2" name="Imagen 1">
+            <a:extLst>
+              <a:ext uri="{FF2B5EF4-FFF2-40B4-BE49-F238E27FC236}">
                 <a16:creationId xmlns:a16="http://schemas.microsoft.com/office/drawing/2014/main" id="{0AB77995-1276-448F-A828-E39F19DADDD1}"/>
               </a:ext>
             </a:extLst>
@@ -4519,7 +4612,1748 @@
 </p:sld>
 </file>
 
+<file path=ppt/slides/slide22.xml><?xml version="1.0" encoding="utf-8"?>
+<p:sld xmlns:a="http://schemas.openxmlformats.org/drawingml/2006/main" xmlns:r="http://schemas.openxmlformats.org/officeDocument/2006/relationships" xmlns:p="http://schemas.openxmlformats.org/presentationml/2006/main">
+  <p:cSld>
+    <p:spTree>
+      <p:nvGrpSpPr>
+        <p:cNvPr id="1" name=""/>
+        <p:cNvGrpSpPr/>
+        <p:nvPr/>
+      </p:nvGrpSpPr>
+      <p:grpSpPr>
+        <a:xfrm>
+          <a:off x="0" y="0"/>
+          <a:ext cx="0" cy="0"/>
+          <a:chOff x="0" y="0"/>
+          <a:chExt cx="0" cy="0"/>
+        </a:xfrm>
+      </p:grpSpPr>
+      <p:sp>
+        <p:nvSpPr>
+          <p:cNvPr id="5" name="CuadroTexto 4">
+            <a:extLst>
+              <a:ext uri="{FF2B5EF4-FFF2-40B4-BE49-F238E27FC236}">
+                <a16:creationId xmlns:a16="http://schemas.microsoft.com/office/drawing/2014/main" id="{7CD4D156-D55C-4D8E-8BE4-EDA4C16123B5}"/>
+              </a:ext>
+            </a:extLst>
+          </p:cNvPr>
+          <p:cNvSpPr txBox="1"/>
+          <p:nvPr/>
+        </p:nvSpPr>
+        <p:spPr>
+          <a:xfrm>
+            <a:off x="1124236" y="397285"/>
+            <a:ext cx="3303830" cy="461665"/>
+          </a:xfrm>
+          <a:prstGeom prst="rect">
+            <a:avLst/>
+          </a:prstGeom>
+          <a:solidFill>
+            <a:schemeClr val="tx1"/>
+          </a:solidFill>
+          <a:ln>
+            <a:noFill/>
+          </a:ln>
+          <a:effectLst>
+            <a:outerShdw blurRad="107950" dist="12700" dir="5400000" algn="ctr">
+              <a:srgbClr val="000000"/>
+            </a:outerShdw>
+          </a:effectLst>
+          <a:scene3d>
+            <a:camera prst="orthographicFront">
+              <a:rot lat="0" lon="0" rev="0"/>
+            </a:camera>
+            <a:lightRig rig="soft" dir="t">
+              <a:rot lat="0" lon="0" rev="0"/>
+            </a:lightRig>
+          </a:scene3d>
+          <a:sp3d contourW="44450" prstMaterial="matte">
+            <a:bevelT w="63500" h="63500" prst="artDeco"/>
+            <a:contourClr>
+              <a:srgbClr val="FFFFFF"/>
+            </a:contourClr>
+          </a:sp3d>
+        </p:spPr>
+        <p:txBody>
+          <a:bodyPr wrap="square" rtlCol="0">
+            <a:spAutoFit/>
+          </a:bodyPr>
+          <a:lstStyle>
+            <a:defPPr>
+              <a:defRPr lang="es-CL"/>
+            </a:defPPr>
+            <a:lvl1pPr algn="ctr">
+              <a:defRPr sz="3200" b="1">
+                <a:solidFill>
+                  <a:schemeClr val="bg1"/>
+                </a:solidFill>
+              </a:defRPr>
+            </a:lvl1pPr>
+          </a:lstStyle>
+          <a:p>
+            <a:r>
+              <a:rPr lang="es-ES" sz="2400" dirty="0"/>
+              <a:t>Sucesiones </a:t>
+            </a:r>
+            <a:r>
+              <a:rPr lang="es-ES" sz="2400" dirty="0">
+                <a:solidFill>
+                  <a:srgbClr val="FFFF00"/>
+                </a:solidFill>
+              </a:rPr>
+              <a:t>Aritméticas</a:t>
+            </a:r>
+          </a:p>
+        </p:txBody>
+      </p:sp>
+      <p:pic>
+        <p:nvPicPr>
+          <p:cNvPr id="4" name="Imagen 3">
+            <a:extLst>
+              <a:ext uri="{FF2B5EF4-FFF2-40B4-BE49-F238E27FC236}">
+                <a16:creationId xmlns:a16="http://schemas.microsoft.com/office/drawing/2014/main" id="{E272B542-0ABD-43E0-AF9C-F142FEBACB2A}"/>
+              </a:ext>
+            </a:extLst>
+          </p:cNvPr>
+          <p:cNvPicPr>
+            <a:picLocks noChangeAspect="1"/>
+          </p:cNvPicPr>
+          <p:nvPr/>
+        </p:nvPicPr>
+        <p:blipFill>
+          <a:blip r:embed="rId3"/>
+          <a:stretch>
+            <a:fillRect/>
+          </a:stretch>
+        </p:blipFill>
+        <p:spPr>
+          <a:xfrm>
+            <a:off x="322835" y="1038829"/>
+            <a:ext cx="3566070" cy="3803019"/>
+          </a:xfrm>
+          <a:prstGeom prst="rect">
+            <a:avLst/>
+          </a:prstGeom>
+        </p:spPr>
+      </p:pic>
+      <p:pic>
+        <p:nvPicPr>
+          <p:cNvPr id="9" name="Imagen 8">
+            <a:extLst>
+              <a:ext uri="{FF2B5EF4-FFF2-40B4-BE49-F238E27FC236}">
+                <a16:creationId xmlns:a16="http://schemas.microsoft.com/office/drawing/2014/main" id="{88039D94-5285-4ADF-9622-ABD3157D8BFC}"/>
+              </a:ext>
+            </a:extLst>
+          </p:cNvPr>
+          <p:cNvPicPr>
+            <a:picLocks noChangeAspect="1"/>
+          </p:cNvPicPr>
+          <p:nvPr/>
+        </p:nvPicPr>
+        <p:blipFill>
+          <a:blip r:embed="rId4"/>
+          <a:stretch>
+            <a:fillRect/>
+          </a:stretch>
+        </p:blipFill>
+        <p:spPr>
+          <a:xfrm>
+            <a:off x="2210791" y="2559322"/>
+            <a:ext cx="1398841" cy="330761"/>
+          </a:xfrm>
+          <a:prstGeom prst="rect">
+            <a:avLst/>
+          </a:prstGeom>
+        </p:spPr>
+      </p:pic>
+      <p:graphicFrame>
+        <p:nvGraphicFramePr>
+          <p:cNvPr id="10" name="Objeto 9">
+            <a:extLst>
+              <a:ext uri="{FF2B5EF4-FFF2-40B4-BE49-F238E27FC236}">
+                <a16:creationId xmlns:a16="http://schemas.microsoft.com/office/drawing/2014/main" id="{6A82173C-AB19-4167-89B3-067782044A96}"/>
+              </a:ext>
+            </a:extLst>
+          </p:cNvPr>
+          <p:cNvGraphicFramePr>
+            <a:graphicFrameLocks noChangeAspect="1"/>
+          </p:cNvGraphicFramePr>
+          <p:nvPr>
+            <p:extLst>
+              <p:ext uri="{D42A27DB-BD31-4B8C-83A1-F6EECF244321}">
+                <p14:modId xmlns:p14="http://schemas.microsoft.com/office/powerpoint/2010/main" val="328490693"/>
+              </p:ext>
+            </p:extLst>
+          </p:nvPr>
+        </p:nvGraphicFramePr>
+        <p:xfrm>
+          <a:off x="880690" y="1077691"/>
+          <a:ext cx="350837" cy="342384"/>
+        </p:xfrm>
+        <a:graphic>
+          <a:graphicData uri="http://schemas.openxmlformats.org/presentationml/2006/ole">
+            <mc:AlternateContent xmlns:mc="http://schemas.openxmlformats.org/markup-compatibility/2006">
+              <mc:Choice xmlns:v="urn:schemas-microsoft-com:vml" Requires="v">
+                <p:oleObj spid="_x0000_s2053" name="Bitmap Image" r:id="rId5" imgW="394910" imgH="386110" progId="PBrush">
+                  <p:embed/>
+                </p:oleObj>
+              </mc:Choice>
+              <mc:Fallback>
+                <p:oleObj name="Bitmap Image" r:id="rId5" imgW="394910" imgH="386110" progId="PBrush">
+                  <p:embed/>
+                  <p:pic>
+                    <p:nvPicPr>
+                      <p:cNvPr id="10" name="Objeto 9">
+                        <a:extLst>
+                          <a:ext uri="{FF2B5EF4-FFF2-40B4-BE49-F238E27FC236}">
+                            <a16:creationId xmlns:a16="http://schemas.microsoft.com/office/drawing/2014/main" id="{6A82173C-AB19-4167-89B3-067782044A96}"/>
+                          </a:ext>
+                        </a:extLst>
+                      </p:cNvPr>
+                      <p:cNvPicPr/>
+                      <p:nvPr/>
+                    </p:nvPicPr>
+                    <p:blipFill>
+                      <a:blip r:embed="rId6"/>
+                      <a:stretch>
+                        <a:fillRect/>
+                      </a:stretch>
+                    </p:blipFill>
+                    <p:spPr>
+                      <a:xfrm>
+                        <a:off x="880690" y="1077691"/>
+                        <a:ext cx="350837" cy="342384"/>
+                      </a:xfrm>
+                      <a:prstGeom prst="rect">
+                        <a:avLst/>
+                      </a:prstGeom>
+                    </p:spPr>
+                  </p:pic>
+                </p:oleObj>
+              </mc:Fallback>
+            </mc:AlternateContent>
+          </a:graphicData>
+        </a:graphic>
+      </p:graphicFrame>
+      <p:pic>
+        <p:nvPicPr>
+          <p:cNvPr id="13" name="Imagen 12">
+            <a:extLst>
+              <a:ext uri="{FF2B5EF4-FFF2-40B4-BE49-F238E27FC236}">
+                <a16:creationId xmlns:a16="http://schemas.microsoft.com/office/drawing/2014/main" id="{B79A6E16-2527-439A-95F4-F2D58B7814FF}"/>
+              </a:ext>
+            </a:extLst>
+          </p:cNvPr>
+          <p:cNvPicPr>
+            <a:picLocks noChangeAspect="1"/>
+          </p:cNvPicPr>
+          <p:nvPr/>
+        </p:nvPicPr>
+        <p:blipFill>
+          <a:blip r:embed="rId7"/>
+          <a:stretch>
+            <a:fillRect/>
+          </a:stretch>
+        </p:blipFill>
+        <p:spPr>
+          <a:xfrm>
+            <a:off x="3609632" y="4546601"/>
+            <a:ext cx="152421" cy="181000"/>
+          </a:xfrm>
+          <a:prstGeom prst="rect">
+            <a:avLst/>
+          </a:prstGeom>
+        </p:spPr>
+      </p:pic>
+      <p:sp>
+        <p:nvSpPr>
+          <p:cNvPr id="17" name="CuadroTexto 16">
+            <a:extLst>
+              <a:ext uri="{FF2B5EF4-FFF2-40B4-BE49-F238E27FC236}">
+                <a16:creationId xmlns:a16="http://schemas.microsoft.com/office/drawing/2014/main" id="{3E7F9584-8CB2-4654-A019-2EEB4D7CF131}"/>
+              </a:ext>
+            </a:extLst>
+          </p:cNvPr>
+          <p:cNvSpPr txBox="1"/>
+          <p:nvPr/>
+        </p:nvSpPr>
+        <p:spPr>
+          <a:xfrm>
+            <a:off x="6829586" y="331710"/>
+            <a:ext cx="3303830" cy="461665"/>
+          </a:xfrm>
+          <a:prstGeom prst="rect">
+            <a:avLst/>
+          </a:prstGeom>
+          <a:solidFill>
+            <a:schemeClr val="tx1"/>
+          </a:solidFill>
+          <a:ln>
+            <a:noFill/>
+          </a:ln>
+          <a:effectLst>
+            <a:outerShdw blurRad="107950" dist="12700" dir="5400000" algn="ctr">
+              <a:srgbClr val="000000"/>
+            </a:outerShdw>
+          </a:effectLst>
+          <a:scene3d>
+            <a:camera prst="orthographicFront">
+              <a:rot lat="0" lon="0" rev="0"/>
+            </a:camera>
+            <a:lightRig rig="soft" dir="t">
+              <a:rot lat="0" lon="0" rev="0"/>
+            </a:lightRig>
+          </a:scene3d>
+          <a:sp3d contourW="44450" prstMaterial="matte">
+            <a:bevelT w="63500" h="63500" prst="artDeco"/>
+            <a:contourClr>
+              <a:srgbClr val="FFFFFF"/>
+            </a:contourClr>
+          </a:sp3d>
+        </p:spPr>
+        <p:txBody>
+          <a:bodyPr wrap="square" rtlCol="0">
+            <a:spAutoFit/>
+          </a:bodyPr>
+          <a:lstStyle>
+            <a:defPPr>
+              <a:defRPr lang="es-CL"/>
+            </a:defPPr>
+            <a:lvl1pPr algn="ctr">
+              <a:defRPr sz="2400" b="1">
+                <a:solidFill>
+                  <a:schemeClr val="bg1"/>
+                </a:solidFill>
+              </a:defRPr>
+            </a:lvl1pPr>
+            <a:lvl2pPr>
+              <a:defRPr>
+                <a:solidFill>
+                  <a:schemeClr val="tx1"/>
+                </a:solidFill>
+              </a:defRPr>
+            </a:lvl2pPr>
+            <a:lvl3pPr>
+              <a:defRPr>
+                <a:solidFill>
+                  <a:schemeClr val="tx1"/>
+                </a:solidFill>
+              </a:defRPr>
+            </a:lvl3pPr>
+            <a:lvl4pPr>
+              <a:defRPr>
+                <a:solidFill>
+                  <a:schemeClr val="tx1"/>
+                </a:solidFill>
+              </a:defRPr>
+            </a:lvl4pPr>
+            <a:lvl5pPr>
+              <a:defRPr>
+                <a:solidFill>
+                  <a:schemeClr val="tx1"/>
+                </a:solidFill>
+              </a:defRPr>
+            </a:lvl5pPr>
+            <a:lvl6pPr>
+              <a:defRPr>
+                <a:solidFill>
+                  <a:schemeClr val="tx1"/>
+                </a:solidFill>
+              </a:defRPr>
+            </a:lvl6pPr>
+            <a:lvl7pPr>
+              <a:defRPr>
+                <a:solidFill>
+                  <a:schemeClr val="tx1"/>
+                </a:solidFill>
+              </a:defRPr>
+            </a:lvl7pPr>
+            <a:lvl8pPr>
+              <a:defRPr>
+                <a:solidFill>
+                  <a:schemeClr val="tx1"/>
+                </a:solidFill>
+              </a:defRPr>
+            </a:lvl8pPr>
+            <a:lvl9pPr>
+              <a:defRPr>
+                <a:solidFill>
+                  <a:schemeClr val="tx1"/>
+                </a:solidFill>
+              </a:defRPr>
+            </a:lvl9pPr>
+          </a:lstStyle>
+          <a:p>
+            <a:r>
+              <a:rPr lang="es-ES" dirty="0"/>
+              <a:t>Sucesiones </a:t>
+            </a:r>
+            <a:r>
+              <a:rPr lang="es-ES" dirty="0">
+                <a:solidFill>
+                  <a:srgbClr val="FFFF00"/>
+                </a:solidFill>
+              </a:rPr>
+              <a:t>Geométricas</a:t>
+            </a:r>
+          </a:p>
+        </p:txBody>
+      </p:sp>
+      <p:pic>
+        <p:nvPicPr>
+          <p:cNvPr id="6" name="Imagen 5">
+            <a:extLst>
+              <a:ext uri="{FF2B5EF4-FFF2-40B4-BE49-F238E27FC236}">
+                <a16:creationId xmlns:a16="http://schemas.microsoft.com/office/drawing/2014/main" id="{B8E06AFD-1E9E-4AFD-BD5F-AE4FDE8347EB}"/>
+              </a:ext>
+            </a:extLst>
+          </p:cNvPr>
+          <p:cNvPicPr>
+            <a:picLocks noChangeAspect="1"/>
+          </p:cNvPicPr>
+          <p:nvPr/>
+        </p:nvPicPr>
+        <p:blipFill>
+          <a:blip r:embed="rId8"/>
+          <a:stretch>
+            <a:fillRect/>
+          </a:stretch>
+        </p:blipFill>
+        <p:spPr>
+          <a:xfrm>
+            <a:off x="6886303" y="1248883"/>
+            <a:ext cx="2283098" cy="3625114"/>
+          </a:xfrm>
+          <a:prstGeom prst="rect">
+            <a:avLst/>
+          </a:prstGeom>
+        </p:spPr>
+      </p:pic>
+      <p:sp>
+        <p:nvSpPr>
+          <p:cNvPr id="18" name="CuadroTexto 17">
+            <a:extLst>
+              <a:ext uri="{FF2B5EF4-FFF2-40B4-BE49-F238E27FC236}">
+                <a16:creationId xmlns:a16="http://schemas.microsoft.com/office/drawing/2014/main" id="{BD1594FE-5E3B-4273-BC29-52BEE05F0190}"/>
+              </a:ext>
+            </a:extLst>
+          </p:cNvPr>
+          <p:cNvSpPr txBox="1"/>
+          <p:nvPr/>
+        </p:nvSpPr>
+        <p:spPr>
+          <a:xfrm>
+            <a:off x="9228666" y="1585724"/>
+            <a:ext cx="840295" cy="1200329"/>
+          </a:xfrm>
+          <a:prstGeom prst="rect">
+            <a:avLst/>
+          </a:prstGeom>
+          <a:noFill/>
+        </p:spPr>
+        <p:txBody>
+          <a:bodyPr wrap="none" rtlCol="0">
+            <a:spAutoFit/>
+          </a:bodyPr>
+          <a:lstStyle/>
+          <a:p>
+            <a:r>
+              <a:rPr lang="es-ES" b="1" dirty="0">
+                <a:solidFill>
+                  <a:srgbClr val="0070C0"/>
+                </a:solidFill>
+              </a:rPr>
+              <a:t>b</a:t>
+            </a:r>
+            <a:r>
+              <a:rPr lang="es-ES" b="1" baseline="-25000" dirty="0">
+                <a:solidFill>
+                  <a:srgbClr val="0070C0"/>
+                </a:solidFill>
+              </a:rPr>
+              <a:t>1</a:t>
+            </a:r>
+            <a:r>
+              <a:rPr lang="es-ES" dirty="0"/>
+              <a:t> = 3</a:t>
+            </a:r>
+          </a:p>
+          <a:p>
+            <a:r>
+              <a:rPr lang="es-ES" dirty="0"/>
+              <a:t>b</a:t>
+            </a:r>
+            <a:r>
+              <a:rPr lang="es-ES" baseline="-25000" dirty="0"/>
+              <a:t>2</a:t>
+            </a:r>
+            <a:r>
+              <a:rPr lang="es-ES" dirty="0"/>
+              <a:t> = 6</a:t>
+            </a:r>
+          </a:p>
+          <a:p>
+            <a:r>
+              <a:rPr lang="es-ES" dirty="0"/>
+              <a:t>b</a:t>
+            </a:r>
+            <a:r>
+              <a:rPr lang="es-ES" baseline="-25000" dirty="0"/>
+              <a:t>3</a:t>
+            </a:r>
+            <a:r>
+              <a:rPr lang="es-ES" dirty="0"/>
+              <a:t> = 12</a:t>
+            </a:r>
+          </a:p>
+          <a:p>
+            <a:endParaRPr lang="es-CL" dirty="0"/>
+          </a:p>
+        </p:txBody>
+      </p:sp>
+      <p:sp>
+        <p:nvSpPr>
+          <p:cNvPr id="19" name="CuadroTexto 18">
+            <a:extLst>
+              <a:ext uri="{FF2B5EF4-FFF2-40B4-BE49-F238E27FC236}">
+                <a16:creationId xmlns:a16="http://schemas.microsoft.com/office/drawing/2014/main" id="{04D2FF4A-4BDE-4784-82CB-FDF218A1D747}"/>
+              </a:ext>
+            </a:extLst>
+          </p:cNvPr>
+          <p:cNvSpPr txBox="1"/>
+          <p:nvPr/>
+        </p:nvSpPr>
+        <p:spPr>
+          <a:xfrm>
+            <a:off x="6779223" y="5041315"/>
+            <a:ext cx="2170787" cy="923330"/>
+          </a:xfrm>
+          <a:prstGeom prst="rect">
+            <a:avLst/>
+          </a:prstGeom>
+        </p:spPr>
+        <p:style>
+          <a:lnRef idx="2">
+            <a:schemeClr val="accent5">
+              <a:shade val="50000"/>
+            </a:schemeClr>
+          </a:lnRef>
+          <a:fillRef idx="1">
+            <a:schemeClr val="accent5"/>
+          </a:fillRef>
+          <a:effectRef idx="0">
+            <a:schemeClr val="accent5"/>
+          </a:effectRef>
+          <a:fontRef idx="minor">
+            <a:schemeClr val="lt1"/>
+          </a:fontRef>
+        </p:style>
+        <p:txBody>
+          <a:bodyPr wrap="none" rtlCol="0">
+            <a:spAutoFit/>
+          </a:bodyPr>
+          <a:lstStyle>
+            <a:defPPr>
+              <a:defRPr lang="es-CL"/>
+            </a:defPPr>
+            <a:lvl1pPr>
+              <a:defRPr>
+                <a:solidFill>
+                  <a:schemeClr val="lt1"/>
+                </a:solidFill>
+              </a:defRPr>
+            </a:lvl1pPr>
+            <a:lvl2pPr>
+              <a:defRPr>
+                <a:solidFill>
+                  <a:schemeClr val="lt1"/>
+                </a:solidFill>
+              </a:defRPr>
+            </a:lvl2pPr>
+            <a:lvl3pPr>
+              <a:defRPr>
+                <a:solidFill>
+                  <a:schemeClr val="lt1"/>
+                </a:solidFill>
+              </a:defRPr>
+            </a:lvl3pPr>
+            <a:lvl4pPr>
+              <a:defRPr>
+                <a:solidFill>
+                  <a:schemeClr val="lt1"/>
+                </a:solidFill>
+              </a:defRPr>
+            </a:lvl4pPr>
+            <a:lvl5pPr>
+              <a:defRPr>
+                <a:solidFill>
+                  <a:schemeClr val="lt1"/>
+                </a:solidFill>
+              </a:defRPr>
+            </a:lvl5pPr>
+            <a:lvl6pPr>
+              <a:defRPr>
+                <a:solidFill>
+                  <a:schemeClr val="lt1"/>
+                </a:solidFill>
+              </a:defRPr>
+            </a:lvl6pPr>
+            <a:lvl7pPr>
+              <a:defRPr>
+                <a:solidFill>
+                  <a:schemeClr val="lt1"/>
+                </a:solidFill>
+              </a:defRPr>
+            </a:lvl7pPr>
+            <a:lvl8pPr>
+              <a:defRPr>
+                <a:solidFill>
+                  <a:schemeClr val="lt1"/>
+                </a:solidFill>
+              </a:defRPr>
+            </a:lvl8pPr>
+            <a:lvl9pPr>
+              <a:defRPr>
+                <a:solidFill>
+                  <a:schemeClr val="lt1"/>
+                </a:solidFill>
+              </a:defRPr>
+            </a:lvl9pPr>
+          </a:lstStyle>
+          <a:p>
+            <a:r>
+              <a:rPr lang="es-ES"/>
+              <a:t>r = b2</a:t>
+            </a:r>
+            <a:r>
+              <a:rPr lang="es-ES" dirty="0"/>
+              <a:t> </a:t>
+            </a:r>
+            <a:r>
+              <a:rPr lang="es-ES"/>
+              <a:t>/ b1 </a:t>
+            </a:r>
+            <a:r>
+              <a:rPr lang="es-ES" dirty="0"/>
+              <a:t>= 6 / 3 = 2</a:t>
+            </a:r>
+          </a:p>
+          <a:p>
+            <a:endParaRPr lang="es-ES" dirty="0"/>
+          </a:p>
+          <a:p>
+            <a:r>
+              <a:rPr lang="es-ES" dirty="0"/>
+              <a:t>r </a:t>
+            </a:r>
+            <a:r>
+              <a:rPr lang="es-ES"/>
+              <a:t>= b3 / b2 = 12 / 6 = 2</a:t>
+            </a:r>
+            <a:endParaRPr lang="es-ES" dirty="0"/>
+          </a:p>
+        </p:txBody>
+      </p:sp>
+      <p:sp>
+        <p:nvSpPr>
+          <p:cNvPr id="20" name="CuadroTexto 19">
+            <a:extLst>
+              <a:ext uri="{FF2B5EF4-FFF2-40B4-BE49-F238E27FC236}">
+                <a16:creationId xmlns:a16="http://schemas.microsoft.com/office/drawing/2014/main" id="{A6597116-C2D3-4253-96E3-495E8C67574D}"/>
+              </a:ext>
+            </a:extLst>
+          </p:cNvPr>
+          <p:cNvSpPr txBox="1"/>
+          <p:nvPr/>
+        </p:nvSpPr>
+        <p:spPr>
+          <a:xfrm>
+            <a:off x="703725" y="5008442"/>
+            <a:ext cx="2196435" cy="923330"/>
+          </a:xfrm>
+          <a:prstGeom prst="rect">
+            <a:avLst/>
+          </a:prstGeom>
+        </p:spPr>
+        <p:style>
+          <a:lnRef idx="2">
+            <a:schemeClr val="dk1">
+              <a:shade val="50000"/>
+            </a:schemeClr>
+          </a:lnRef>
+          <a:fillRef idx="1">
+            <a:schemeClr val="dk1"/>
+          </a:fillRef>
+          <a:effectRef idx="0">
+            <a:schemeClr val="dk1"/>
+          </a:effectRef>
+          <a:fontRef idx="minor">
+            <a:schemeClr val="lt1"/>
+          </a:fontRef>
+        </p:style>
+        <p:txBody>
+          <a:bodyPr wrap="none" rtlCol="0">
+            <a:spAutoFit/>
+          </a:bodyPr>
+          <a:lstStyle/>
+          <a:p>
+            <a:r>
+              <a:rPr lang="es-ES" dirty="0"/>
+              <a:t>d = a</a:t>
+            </a:r>
+            <a:r>
+              <a:rPr lang="es-ES" b="1" baseline="-25000" dirty="0">
+                <a:solidFill>
+                  <a:srgbClr val="FF0000"/>
+                </a:solidFill>
+              </a:rPr>
+              <a:t>2</a:t>
+            </a:r>
+            <a:r>
+              <a:rPr lang="es-ES" dirty="0"/>
+              <a:t> - a</a:t>
+            </a:r>
+            <a:r>
+              <a:rPr lang="es-ES" b="1" baseline="-25000" dirty="0">
+                <a:solidFill>
+                  <a:srgbClr val="FF0000"/>
+                </a:solidFill>
+              </a:rPr>
+              <a:t>1</a:t>
+            </a:r>
+            <a:r>
+              <a:rPr lang="es-ES" baseline="-25000" dirty="0"/>
+              <a:t> </a:t>
+            </a:r>
+            <a:r>
+              <a:rPr lang="es-ES" dirty="0"/>
+              <a:t>= 7 - 4 = 3</a:t>
+            </a:r>
+          </a:p>
+          <a:p>
+            <a:endParaRPr lang="es-ES" dirty="0"/>
+          </a:p>
+          <a:p>
+            <a:r>
+              <a:rPr lang="es-ES" dirty="0"/>
+              <a:t>d = a</a:t>
+            </a:r>
+            <a:r>
+              <a:rPr lang="es-ES" b="1" baseline="-25000" dirty="0">
+                <a:solidFill>
+                  <a:srgbClr val="FF0000"/>
+                </a:solidFill>
+              </a:rPr>
+              <a:t>3</a:t>
+            </a:r>
+            <a:r>
+              <a:rPr lang="es-ES" dirty="0"/>
+              <a:t> – a</a:t>
+            </a:r>
+            <a:r>
+              <a:rPr lang="es-ES" b="1" baseline="-25000" dirty="0">
+                <a:solidFill>
+                  <a:srgbClr val="FF0000"/>
+                </a:solidFill>
+              </a:rPr>
+              <a:t>2</a:t>
+            </a:r>
+            <a:r>
+              <a:rPr lang="es-ES" baseline="-25000" dirty="0"/>
+              <a:t> </a:t>
+            </a:r>
+            <a:r>
+              <a:rPr lang="es-ES" dirty="0"/>
+              <a:t>= 10 - 7 = 3</a:t>
+            </a:r>
+          </a:p>
+        </p:txBody>
+      </p:sp>
+      <p:sp>
+        <p:nvSpPr>
+          <p:cNvPr id="21" name="CuadroTexto 20">
+            <a:extLst>
+              <a:ext uri="{FF2B5EF4-FFF2-40B4-BE49-F238E27FC236}">
+                <a16:creationId xmlns:a16="http://schemas.microsoft.com/office/drawing/2014/main" id="{78479A40-6A35-4613-A6C6-484897266DDF}"/>
+              </a:ext>
+            </a:extLst>
+          </p:cNvPr>
+          <p:cNvSpPr txBox="1"/>
+          <p:nvPr/>
+        </p:nvSpPr>
+        <p:spPr>
+          <a:xfrm>
+            <a:off x="4013529" y="1599604"/>
+            <a:ext cx="829073" cy="1200329"/>
+          </a:xfrm>
+          <a:prstGeom prst="rect">
+            <a:avLst/>
+          </a:prstGeom>
+          <a:noFill/>
+        </p:spPr>
+        <p:txBody>
+          <a:bodyPr wrap="none" rtlCol="0">
+            <a:spAutoFit/>
+          </a:bodyPr>
+          <a:lstStyle/>
+          <a:p>
+            <a:r>
+              <a:rPr lang="es-ES" b="1" dirty="0">
+                <a:solidFill>
+                  <a:srgbClr val="0070C0"/>
+                </a:solidFill>
+              </a:rPr>
+              <a:t>a</a:t>
+            </a:r>
+            <a:r>
+              <a:rPr lang="es-ES" b="1" baseline="-25000" dirty="0">
+                <a:solidFill>
+                  <a:srgbClr val="0070C0"/>
+                </a:solidFill>
+              </a:rPr>
+              <a:t>1</a:t>
+            </a:r>
+            <a:r>
+              <a:rPr lang="es-ES" dirty="0"/>
+              <a:t> = 4</a:t>
+            </a:r>
+          </a:p>
+          <a:p>
+            <a:r>
+              <a:rPr lang="es-ES" dirty="0"/>
+              <a:t>a</a:t>
+            </a:r>
+            <a:r>
+              <a:rPr lang="es-ES" baseline="-25000" dirty="0"/>
+              <a:t>2</a:t>
+            </a:r>
+            <a:r>
+              <a:rPr lang="es-ES" dirty="0"/>
+              <a:t> = 7</a:t>
+            </a:r>
+          </a:p>
+          <a:p>
+            <a:r>
+              <a:rPr lang="es-ES" dirty="0"/>
+              <a:t>a</a:t>
+            </a:r>
+            <a:r>
+              <a:rPr lang="es-ES" baseline="-25000" dirty="0"/>
+              <a:t>3</a:t>
+            </a:r>
+            <a:r>
+              <a:rPr lang="es-ES" dirty="0"/>
+              <a:t> = 10</a:t>
+            </a:r>
+          </a:p>
+          <a:p>
+            <a:endParaRPr lang="es-CL" dirty="0"/>
+          </a:p>
+        </p:txBody>
+      </p:sp>
+      <p:sp>
+        <p:nvSpPr>
+          <p:cNvPr id="22" name="CuadroTexto 21">
+            <a:extLst>
+              <a:ext uri="{FF2B5EF4-FFF2-40B4-BE49-F238E27FC236}">
+                <a16:creationId xmlns:a16="http://schemas.microsoft.com/office/drawing/2014/main" id="{309C2A30-1E85-47A5-9A11-BBEE79462137}"/>
+              </a:ext>
+            </a:extLst>
+          </p:cNvPr>
+          <p:cNvSpPr txBox="1"/>
+          <p:nvPr/>
+        </p:nvSpPr>
+        <p:spPr>
+          <a:xfrm>
+            <a:off x="9442883" y="2716390"/>
+            <a:ext cx="2024913" cy="2308324"/>
+          </a:xfrm>
+          <a:prstGeom prst="rect">
+            <a:avLst/>
+          </a:prstGeom>
+        </p:spPr>
+        <p:style>
+          <a:lnRef idx="2">
+            <a:schemeClr val="accent5">
+              <a:shade val="50000"/>
+            </a:schemeClr>
+          </a:lnRef>
+          <a:fillRef idx="1">
+            <a:schemeClr val="accent5"/>
+          </a:fillRef>
+          <a:effectRef idx="0">
+            <a:schemeClr val="accent5"/>
+          </a:effectRef>
+          <a:fontRef idx="minor">
+            <a:schemeClr val="lt1"/>
+          </a:fontRef>
+        </p:style>
+        <p:txBody>
+          <a:bodyPr wrap="none" rtlCol="0">
+            <a:spAutoFit/>
+          </a:bodyPr>
+          <a:lstStyle/>
+          <a:p>
+            <a:r>
+              <a:rPr lang="es-ES" b="1" dirty="0"/>
+              <a:t>b </a:t>
+            </a:r>
+            <a:r>
+              <a:rPr lang="es-ES" b="1" baseline="-25000" dirty="0"/>
+              <a:t>n</a:t>
+            </a:r>
+            <a:r>
+              <a:rPr lang="es-ES" b="1" dirty="0"/>
+              <a:t> = b</a:t>
+            </a:r>
+            <a:r>
+              <a:rPr lang="es-ES" b="1" baseline="-25000" dirty="0">
+                <a:solidFill>
+                  <a:srgbClr val="FF0000"/>
+                </a:solidFill>
+              </a:rPr>
+              <a:t>1</a:t>
+            </a:r>
+            <a:r>
+              <a:rPr lang="es-ES" b="1" baseline="-25000" dirty="0"/>
+              <a:t> </a:t>
+            </a:r>
+            <a:r>
+              <a:rPr lang="es-ES" b="1" dirty="0"/>
+              <a:t>* r </a:t>
+            </a:r>
+            <a:r>
+              <a:rPr lang="es-ES" b="1" baseline="30000" dirty="0"/>
+              <a:t>(n – 1)</a:t>
+            </a:r>
+          </a:p>
+          <a:p>
+            <a:endParaRPr lang="es-ES" b="1" dirty="0"/>
+          </a:p>
+          <a:p>
+            <a:r>
+              <a:rPr lang="es-ES" b="1" i="1" u="sng" dirty="0"/>
+              <a:t>En Python</a:t>
+            </a:r>
+          </a:p>
+          <a:p>
+            <a:endParaRPr lang="es-ES" b="1" i="1" u="sng" dirty="0"/>
+          </a:p>
+          <a:p>
+            <a:r>
+              <a:rPr lang="es-ES" b="1" dirty="0"/>
+              <a:t>b </a:t>
+            </a:r>
+            <a:r>
+              <a:rPr lang="es-ES" b="1" baseline="-25000" dirty="0"/>
+              <a:t>n</a:t>
+            </a:r>
+            <a:r>
+              <a:rPr lang="es-ES" baseline="-25000" dirty="0"/>
+              <a:t> </a:t>
+            </a:r>
+            <a:r>
+              <a:rPr lang="es-ES" b="1" dirty="0"/>
+              <a:t>= b</a:t>
+            </a:r>
+            <a:r>
+              <a:rPr lang="es-ES" b="1" baseline="-25000" dirty="0">
+                <a:solidFill>
+                  <a:srgbClr val="FF0000"/>
+                </a:solidFill>
+              </a:rPr>
+              <a:t>1</a:t>
+            </a:r>
+            <a:r>
+              <a:rPr lang="es-ES" b="1" baseline="-25000" dirty="0"/>
+              <a:t> </a:t>
+            </a:r>
+            <a:r>
+              <a:rPr lang="es-ES" b="1" dirty="0"/>
+              <a:t>* r **(n – 1)</a:t>
+            </a:r>
+          </a:p>
+          <a:p>
+            <a:endParaRPr lang="es-ES" b="1" dirty="0"/>
+          </a:p>
+          <a:p>
+            <a:r>
+              <a:rPr lang="es-ES" b="1" dirty="0"/>
+              <a:t>b </a:t>
+            </a:r>
+            <a:r>
+              <a:rPr lang="es-ES" b="1" baseline="-25000" dirty="0"/>
+              <a:t>n</a:t>
+            </a:r>
+            <a:r>
+              <a:rPr lang="es-ES" baseline="-25000" dirty="0"/>
+              <a:t> </a:t>
+            </a:r>
+            <a:r>
+              <a:rPr lang="es-ES" b="1" dirty="0"/>
+              <a:t>= 3</a:t>
+            </a:r>
+            <a:r>
+              <a:rPr lang="es-ES" b="1" baseline="-25000" dirty="0"/>
+              <a:t> </a:t>
+            </a:r>
+            <a:r>
+              <a:rPr lang="es-ES" b="1" dirty="0"/>
+              <a:t>* 2 **(n – 1)</a:t>
+            </a:r>
+          </a:p>
+          <a:p>
+            <a:endParaRPr lang="es-ES" b="1" dirty="0"/>
+          </a:p>
+        </p:txBody>
+      </p:sp>
+      <p:sp>
+        <p:nvSpPr>
+          <p:cNvPr id="23" name="CuadroTexto 22">
+            <a:extLst>
+              <a:ext uri="{FF2B5EF4-FFF2-40B4-BE49-F238E27FC236}">
+                <a16:creationId xmlns:a16="http://schemas.microsoft.com/office/drawing/2014/main" id="{E5D234F7-218A-4E3D-AFCF-FF0A2A7957AC}"/>
+              </a:ext>
+            </a:extLst>
+          </p:cNvPr>
+          <p:cNvSpPr txBox="1"/>
+          <p:nvPr/>
+        </p:nvSpPr>
+        <p:spPr>
+          <a:xfrm>
+            <a:off x="3976270" y="2696431"/>
+            <a:ext cx="2055371" cy="2031325"/>
+          </a:xfrm>
+          <a:prstGeom prst="rect">
+            <a:avLst/>
+          </a:prstGeom>
+        </p:spPr>
+        <p:style>
+          <a:lnRef idx="3">
+            <a:schemeClr val="lt1"/>
+          </a:lnRef>
+          <a:fillRef idx="1">
+            <a:schemeClr val="dk1"/>
+          </a:fillRef>
+          <a:effectRef idx="1">
+            <a:schemeClr val="dk1"/>
+          </a:effectRef>
+          <a:fontRef idx="minor">
+            <a:schemeClr val="lt1"/>
+          </a:fontRef>
+        </p:style>
+        <p:txBody>
+          <a:bodyPr wrap="none" rtlCol="0">
+            <a:spAutoFit/>
+          </a:bodyPr>
+          <a:lstStyle/>
+          <a:p>
+            <a:r>
+              <a:rPr lang="es-ES" b="1" dirty="0"/>
+              <a:t>a </a:t>
+            </a:r>
+            <a:r>
+              <a:rPr lang="es-ES" b="1" baseline="-25000" dirty="0"/>
+              <a:t>n</a:t>
+            </a:r>
+            <a:r>
+              <a:rPr lang="es-ES" b="1" dirty="0"/>
+              <a:t> = a</a:t>
+            </a:r>
+            <a:r>
+              <a:rPr lang="es-ES" b="1" baseline="-25000" dirty="0">
+                <a:solidFill>
+                  <a:srgbClr val="FF0000"/>
+                </a:solidFill>
+              </a:rPr>
+              <a:t>1</a:t>
+            </a:r>
+            <a:r>
+              <a:rPr lang="es-ES" b="1" baseline="-25000" dirty="0"/>
+              <a:t> </a:t>
+            </a:r>
+            <a:r>
+              <a:rPr lang="es-ES" b="1" dirty="0"/>
+              <a:t> + (n – 1) d</a:t>
+            </a:r>
+            <a:endParaRPr lang="es-ES" b="1" baseline="30000" dirty="0"/>
+          </a:p>
+          <a:p>
+            <a:endParaRPr lang="es-ES" b="1" dirty="0"/>
+          </a:p>
+          <a:p>
+            <a:r>
+              <a:rPr lang="es-ES" b="1" i="1" u="sng" dirty="0"/>
+              <a:t>En Python</a:t>
+            </a:r>
+          </a:p>
+          <a:p>
+            <a:endParaRPr lang="es-ES" b="1" i="1" u="sng" dirty="0"/>
+          </a:p>
+          <a:p>
+            <a:r>
+              <a:rPr lang="es-ES" b="1" dirty="0"/>
+              <a:t>a </a:t>
+            </a:r>
+            <a:r>
+              <a:rPr lang="es-ES" b="1" baseline="-25000" dirty="0"/>
+              <a:t>n</a:t>
+            </a:r>
+            <a:r>
+              <a:rPr lang="es-ES" b="1" dirty="0"/>
+              <a:t> = a</a:t>
+            </a:r>
+            <a:r>
+              <a:rPr lang="es-ES" b="1" baseline="-25000" dirty="0">
+                <a:solidFill>
+                  <a:srgbClr val="FF0000"/>
+                </a:solidFill>
+              </a:rPr>
+              <a:t>1</a:t>
+            </a:r>
+            <a:r>
+              <a:rPr lang="es-ES" b="1" baseline="-25000" dirty="0"/>
+              <a:t> </a:t>
+            </a:r>
+            <a:r>
+              <a:rPr lang="es-ES" b="1" dirty="0"/>
+              <a:t> + (n – 1) * d</a:t>
+            </a:r>
+            <a:endParaRPr lang="es-ES" b="1" baseline="30000" dirty="0"/>
+          </a:p>
+          <a:p>
+            <a:endParaRPr lang="es-ES" b="1" dirty="0"/>
+          </a:p>
+          <a:p>
+            <a:r>
+              <a:rPr lang="es-ES" b="1" dirty="0"/>
+              <a:t>a </a:t>
+            </a:r>
+            <a:r>
+              <a:rPr lang="es-ES" b="1" baseline="-25000" dirty="0"/>
+              <a:t>n</a:t>
+            </a:r>
+            <a:r>
+              <a:rPr lang="es-ES" b="1" dirty="0"/>
+              <a:t> = 4 + (n – 1) * 3</a:t>
+            </a:r>
+            <a:endParaRPr lang="es-ES" b="1" baseline="30000" dirty="0"/>
+          </a:p>
+        </p:txBody>
+      </p:sp>
+    </p:spTree>
+    <p:extLst>
+      <p:ext uri="{BB962C8B-B14F-4D97-AF65-F5344CB8AC3E}">
+        <p14:creationId xmlns:p14="http://schemas.microsoft.com/office/powerpoint/2010/main" val="1609783674"/>
+      </p:ext>
+    </p:extLst>
+  </p:cSld>
+  <p:clrMapOvr>
+    <a:masterClrMapping/>
+  </p:clrMapOvr>
+</p:sld>
+</file>
+
+<file path=ppt/slides/slide23.xml><?xml version="1.0" encoding="utf-8"?>
+<p:sld xmlns:a="http://schemas.openxmlformats.org/drawingml/2006/main" xmlns:r="http://schemas.openxmlformats.org/officeDocument/2006/relationships" xmlns:p="http://schemas.openxmlformats.org/presentationml/2006/main">
+  <p:cSld>
+    <p:spTree>
+      <p:nvGrpSpPr>
+        <p:cNvPr id="1" name=""/>
+        <p:cNvGrpSpPr/>
+        <p:nvPr/>
+      </p:nvGrpSpPr>
+      <p:grpSpPr>
+        <a:xfrm>
+          <a:off x="0" y="0"/>
+          <a:ext cx="0" cy="0"/>
+          <a:chOff x="0" y="0"/>
+          <a:chExt cx="0" cy="0"/>
+        </a:xfrm>
+      </p:grpSpPr>
+    </p:spTree>
+    <p:extLst>
+      <p:ext uri="{BB962C8B-B14F-4D97-AF65-F5344CB8AC3E}">
+        <p14:creationId xmlns:p14="http://schemas.microsoft.com/office/powerpoint/2010/main" val="1889794997"/>
+      </p:ext>
+    </p:extLst>
+  </p:cSld>
+  <p:clrMapOvr>
+    <a:masterClrMapping/>
+  </p:clrMapOvr>
+</p:sld>
+</file>
+
 <file path=ppt/slides/slide3.xml><?xml version="1.0" encoding="utf-8"?>
+<p:sld xmlns:a="http://schemas.openxmlformats.org/drawingml/2006/main" xmlns:r="http://schemas.openxmlformats.org/officeDocument/2006/relationships" xmlns:p="http://schemas.openxmlformats.org/presentationml/2006/main">
+  <p:cSld>
+    <p:spTree>
+      <p:nvGrpSpPr>
+        <p:cNvPr id="1" name=""/>
+        <p:cNvGrpSpPr/>
+        <p:nvPr/>
+      </p:nvGrpSpPr>
+      <p:grpSpPr>
+        <a:xfrm>
+          <a:off x="0" y="0"/>
+          <a:ext cx="0" cy="0"/>
+          <a:chOff x="0" y="0"/>
+          <a:chExt cx="0" cy="0"/>
+        </a:xfrm>
+      </p:grpSpPr>
+      <p:sp>
+        <p:nvSpPr>
+          <p:cNvPr id="3" name="CuadroTexto 2">
+            <a:extLst>
+              <a:ext uri="{FF2B5EF4-FFF2-40B4-BE49-F238E27FC236}">
+                <a16:creationId xmlns:a16="http://schemas.microsoft.com/office/drawing/2014/main" id="{FA53A724-8E43-4D27-B03A-DC0E96980238}"/>
+              </a:ext>
+            </a:extLst>
+          </p:cNvPr>
+          <p:cNvSpPr txBox="1"/>
+          <p:nvPr/>
+        </p:nvSpPr>
+        <p:spPr>
+          <a:xfrm>
+            <a:off x="6400799" y="463685"/>
+            <a:ext cx="3640668" cy="830997"/>
+          </a:xfrm>
+          <a:prstGeom prst="rect">
+            <a:avLst/>
+          </a:prstGeom>
+          <a:solidFill>
+            <a:schemeClr val="tx1"/>
+          </a:solidFill>
+          <a:ln>
+            <a:noFill/>
+          </a:ln>
+          <a:effectLst>
+            <a:outerShdw blurRad="107950" dist="12700" dir="5400000" algn="ctr">
+              <a:srgbClr val="000000"/>
+            </a:outerShdw>
+          </a:effectLst>
+          <a:scene3d>
+            <a:camera prst="orthographicFront">
+              <a:rot lat="0" lon="0" rev="0"/>
+            </a:camera>
+            <a:lightRig rig="soft" dir="t">
+              <a:rot lat="0" lon="0" rev="0"/>
+            </a:lightRig>
+          </a:scene3d>
+          <a:sp3d contourW="44450" prstMaterial="matte">
+            <a:bevelT w="63500" h="63500" prst="artDeco"/>
+            <a:contourClr>
+              <a:srgbClr val="FFFFFF"/>
+            </a:contourClr>
+          </a:sp3d>
+        </p:spPr>
+        <p:txBody>
+          <a:bodyPr wrap="square" rtlCol="0">
+            <a:spAutoFit/>
+          </a:bodyPr>
+          <a:lstStyle>
+            <a:defPPr>
+              <a:defRPr lang="es-CL"/>
+            </a:defPPr>
+            <a:lvl1pPr algn="ctr">
+              <a:defRPr sz="3200" b="1">
+                <a:solidFill>
+                  <a:schemeClr val="bg1"/>
+                </a:solidFill>
+              </a:defRPr>
+            </a:lvl1pPr>
+          </a:lstStyle>
+          <a:p>
+            <a:r>
+              <a:rPr lang="es-ES" sz="2400" dirty="0"/>
+              <a:t>Funciones Discretas </a:t>
+            </a:r>
+            <a:r>
+              <a:rPr lang="es-ES" sz="2400" dirty="0">
+                <a:solidFill>
+                  <a:srgbClr val="FFFF00"/>
+                </a:solidFill>
+              </a:rPr>
+              <a:t>Sucesiones (progresiones)</a:t>
+            </a:r>
+          </a:p>
+        </p:txBody>
+      </p:sp>
+      <p:pic>
+        <p:nvPicPr>
+          <p:cNvPr id="4" name="Imagen 3">
+            <a:extLst>
+              <a:ext uri="{FF2B5EF4-FFF2-40B4-BE49-F238E27FC236}">
+                <a16:creationId xmlns:a16="http://schemas.microsoft.com/office/drawing/2014/main" id="{E272B542-0ABD-43E0-AF9C-F142FEBACB2A}"/>
+              </a:ext>
+            </a:extLst>
+          </p:cNvPr>
+          <p:cNvPicPr>
+            <a:picLocks noChangeAspect="1"/>
+          </p:cNvPicPr>
+          <p:nvPr/>
+        </p:nvPicPr>
+        <p:blipFill>
+          <a:blip r:embed="rId3"/>
+          <a:stretch>
+            <a:fillRect/>
+          </a:stretch>
+        </p:blipFill>
+        <p:spPr>
+          <a:xfrm>
+            <a:off x="6334657" y="1701798"/>
+            <a:ext cx="3566070" cy="3803019"/>
+          </a:xfrm>
+          <a:prstGeom prst="rect">
+            <a:avLst/>
+          </a:prstGeom>
+        </p:spPr>
+      </p:pic>
+      <p:sp>
+        <p:nvSpPr>
+          <p:cNvPr id="5" name="CuadroTexto 4">
+            <a:extLst>
+              <a:ext uri="{FF2B5EF4-FFF2-40B4-BE49-F238E27FC236}">
+                <a16:creationId xmlns:a16="http://schemas.microsoft.com/office/drawing/2014/main" id="{7CD4D156-D55C-4D8E-8BE4-EDA4C16123B5}"/>
+              </a:ext>
+            </a:extLst>
+          </p:cNvPr>
+          <p:cNvSpPr txBox="1"/>
+          <p:nvPr/>
+        </p:nvSpPr>
+        <p:spPr>
+          <a:xfrm>
+            <a:off x="1124236" y="397285"/>
+            <a:ext cx="3303830" cy="461665"/>
+          </a:xfrm>
+          <a:prstGeom prst="rect">
+            <a:avLst/>
+          </a:prstGeom>
+          <a:solidFill>
+            <a:schemeClr val="tx1"/>
+          </a:solidFill>
+          <a:ln>
+            <a:noFill/>
+          </a:ln>
+          <a:effectLst>
+            <a:outerShdw blurRad="107950" dist="12700" dir="5400000" algn="ctr">
+              <a:srgbClr val="000000"/>
+            </a:outerShdw>
+          </a:effectLst>
+          <a:scene3d>
+            <a:camera prst="orthographicFront">
+              <a:rot lat="0" lon="0" rev="0"/>
+            </a:camera>
+            <a:lightRig rig="soft" dir="t">
+              <a:rot lat="0" lon="0" rev="0"/>
+            </a:lightRig>
+          </a:scene3d>
+          <a:sp3d contourW="44450" prstMaterial="matte">
+            <a:bevelT w="63500" h="63500" prst="artDeco"/>
+            <a:contourClr>
+              <a:srgbClr val="FFFFFF"/>
+            </a:contourClr>
+          </a:sp3d>
+        </p:spPr>
+        <p:txBody>
+          <a:bodyPr wrap="square" rtlCol="0">
+            <a:spAutoFit/>
+          </a:bodyPr>
+          <a:lstStyle>
+            <a:defPPr>
+              <a:defRPr lang="es-CL"/>
+            </a:defPPr>
+            <a:lvl1pPr algn="ctr">
+              <a:defRPr sz="3200" b="1">
+                <a:solidFill>
+                  <a:schemeClr val="bg1"/>
+                </a:solidFill>
+              </a:defRPr>
+            </a:lvl1pPr>
+          </a:lstStyle>
+          <a:p>
+            <a:r>
+              <a:rPr lang="es-ES" sz="2400" dirty="0"/>
+              <a:t>Funciones Continuas</a:t>
+            </a:r>
+          </a:p>
+        </p:txBody>
+      </p:sp>
+      <p:pic>
+        <p:nvPicPr>
+          <p:cNvPr id="9" name="Imagen 8">
+            <a:extLst>
+              <a:ext uri="{FF2B5EF4-FFF2-40B4-BE49-F238E27FC236}">
+                <a16:creationId xmlns:a16="http://schemas.microsoft.com/office/drawing/2014/main" id="{88039D94-5285-4ADF-9622-ABD3157D8BFC}"/>
+              </a:ext>
+            </a:extLst>
+          </p:cNvPr>
+          <p:cNvPicPr>
+            <a:picLocks noChangeAspect="1"/>
+          </p:cNvPicPr>
+          <p:nvPr/>
+        </p:nvPicPr>
+        <p:blipFill>
+          <a:blip r:embed="rId4"/>
+          <a:stretch>
+            <a:fillRect/>
+          </a:stretch>
+        </p:blipFill>
+        <p:spPr>
+          <a:xfrm>
+            <a:off x="8250224" y="3272546"/>
+            <a:ext cx="1398841" cy="330761"/>
+          </a:xfrm>
+          <a:prstGeom prst="rect">
+            <a:avLst/>
+          </a:prstGeom>
+        </p:spPr>
+      </p:pic>
+      <p:graphicFrame>
+        <p:nvGraphicFramePr>
+          <p:cNvPr id="10" name="Objeto 9">
+            <a:extLst>
+              <a:ext uri="{FF2B5EF4-FFF2-40B4-BE49-F238E27FC236}">
+                <a16:creationId xmlns:a16="http://schemas.microsoft.com/office/drawing/2014/main" id="{6A82173C-AB19-4167-89B3-067782044A96}"/>
+              </a:ext>
+            </a:extLst>
+          </p:cNvPr>
+          <p:cNvGraphicFramePr>
+            <a:graphicFrameLocks noChangeAspect="1"/>
+          </p:cNvGraphicFramePr>
+          <p:nvPr>
+            <p:extLst>
+              <p:ext uri="{D42A27DB-BD31-4B8C-83A1-F6EECF244321}">
+                <p14:modId xmlns:p14="http://schemas.microsoft.com/office/powerpoint/2010/main" val="182803363"/>
+              </p:ext>
+            </p:extLst>
+          </p:nvPr>
+        </p:nvGraphicFramePr>
+        <p:xfrm>
+          <a:off x="6922030" y="1818850"/>
+          <a:ext cx="350837" cy="342384"/>
+        </p:xfrm>
+        <a:graphic>
+          <a:graphicData uri="http://schemas.openxmlformats.org/presentationml/2006/ole">
+            <mc:AlternateContent xmlns:mc="http://schemas.openxmlformats.org/markup-compatibility/2006">
+              <mc:Choice xmlns:v="urn:schemas-microsoft-com:vml" Requires="v">
+                <p:oleObj spid="_x0000_s1036" name="Bitmap Image" r:id="rId5" imgW="394910" imgH="386110" progId="PBrush">
+                  <p:embed/>
+                </p:oleObj>
+              </mc:Choice>
+              <mc:Fallback>
+                <p:oleObj name="Bitmap Image" r:id="rId5" imgW="394910" imgH="386110" progId="PBrush">
+                  <p:embed/>
+                  <p:pic>
+                    <p:nvPicPr>
+                      <p:cNvPr id="0" name=""/>
+                      <p:cNvPicPr/>
+                      <p:nvPr/>
+                    </p:nvPicPr>
+                    <p:blipFill>
+                      <a:blip r:embed="rId6"/>
+                      <a:stretch>
+                        <a:fillRect/>
+                      </a:stretch>
+                    </p:blipFill>
+                    <p:spPr>
+                      <a:xfrm>
+                        <a:off x="6922030" y="1818850"/>
+                        <a:ext cx="350837" cy="342384"/>
+                      </a:xfrm>
+                      <a:prstGeom prst="rect">
+                        <a:avLst/>
+                      </a:prstGeom>
+                    </p:spPr>
+                  </p:pic>
+                </p:oleObj>
+              </mc:Fallback>
+            </mc:AlternateContent>
+          </a:graphicData>
+        </a:graphic>
+      </p:graphicFrame>
+      <p:grpSp>
+        <p:nvGrpSpPr>
+          <p:cNvPr id="14" name="Grupo 13">
+            <a:extLst>
+              <a:ext uri="{FF2B5EF4-FFF2-40B4-BE49-F238E27FC236}">
+                <a16:creationId xmlns:a16="http://schemas.microsoft.com/office/drawing/2014/main" id="{E13DCB75-D012-4C2F-8B1D-731BC0ECA1FC}"/>
+              </a:ext>
+            </a:extLst>
+          </p:cNvPr>
+          <p:cNvGrpSpPr/>
+          <p:nvPr/>
+        </p:nvGrpSpPr>
+        <p:grpSpPr>
+          <a:xfrm>
+            <a:off x="972652" y="1650047"/>
+            <a:ext cx="3965817" cy="4041651"/>
+            <a:chOff x="975379" y="1579918"/>
+            <a:chExt cx="4069819" cy="4130849"/>
+          </a:xfrm>
+        </p:grpSpPr>
+        <p:graphicFrame>
+          <p:nvGraphicFramePr>
+            <p:cNvPr id="7" name="Objeto 6">
+              <a:extLst>
+                <a:ext uri="{FF2B5EF4-FFF2-40B4-BE49-F238E27FC236}">
+                  <a16:creationId xmlns:a16="http://schemas.microsoft.com/office/drawing/2014/main" id="{6B6A78A8-2DE4-4176-B688-234937485EEF}"/>
+                </a:ext>
+              </a:extLst>
+            </p:cNvPr>
+            <p:cNvGraphicFramePr>
+              <a:graphicFrameLocks noChangeAspect="1"/>
+            </p:cNvGraphicFramePr>
+            <p:nvPr>
+              <p:extLst>
+                <p:ext uri="{D42A27DB-BD31-4B8C-83A1-F6EECF244321}">
+                  <p14:modId xmlns:p14="http://schemas.microsoft.com/office/powerpoint/2010/main" val="3316846596"/>
+                </p:ext>
+              </p:extLst>
+            </p:nvPr>
+          </p:nvGraphicFramePr>
+          <p:xfrm>
+            <a:off x="975379" y="1579918"/>
+            <a:ext cx="4069819" cy="4130849"/>
+          </p:xfrm>
+          <a:graphic>
+            <a:graphicData uri="http://schemas.openxmlformats.org/presentationml/2006/ole">
+              <mc:AlternateContent xmlns:mc="http://schemas.openxmlformats.org/markup-compatibility/2006">
+                <mc:Choice xmlns:v="urn:schemas-microsoft-com:vml" Requires="v">
+                  <p:oleObj spid="_x0000_s1037" name="Bitmap Image" r:id="rId7" imgW="5398951" imgH="5480260" progId="PBrush">
+                    <p:embed/>
+                  </p:oleObj>
+                </mc:Choice>
+                <mc:Fallback>
+                  <p:oleObj name="Bitmap Image" r:id="rId7" imgW="5398951" imgH="5480260" progId="PBrush">
+                    <p:embed/>
+                    <p:pic>
+                      <p:nvPicPr>
+                        <p:cNvPr id="0" name=""/>
+                        <p:cNvPicPr/>
+                        <p:nvPr/>
+                      </p:nvPicPr>
+                      <p:blipFill>
+                        <a:blip r:embed="rId8"/>
+                        <a:stretch>
+                          <a:fillRect/>
+                        </a:stretch>
+                      </p:blipFill>
+                      <p:spPr>
+                        <a:xfrm>
+                          <a:off x="975379" y="1579918"/>
+                          <a:ext cx="4069819" cy="4130849"/>
+                        </a:xfrm>
+                        <a:prstGeom prst="rect">
+                          <a:avLst/>
+                        </a:prstGeom>
+                      </p:spPr>
+                    </p:pic>
+                  </p:oleObj>
+                </mc:Fallback>
+              </mc:AlternateContent>
+            </a:graphicData>
+          </a:graphic>
+        </p:graphicFrame>
+        <p:graphicFrame>
+          <p:nvGraphicFramePr>
+            <p:cNvPr id="11" name="Objeto 10">
+              <a:extLst>
+                <a:ext uri="{FF2B5EF4-FFF2-40B4-BE49-F238E27FC236}">
+                  <a16:creationId xmlns:a16="http://schemas.microsoft.com/office/drawing/2014/main" id="{3CDB62E4-89D8-404F-9479-49AB3F1868F7}"/>
+                </a:ext>
+              </a:extLst>
+            </p:cNvPr>
+            <p:cNvGraphicFramePr>
+              <a:graphicFrameLocks noChangeAspect="1"/>
+            </p:cNvGraphicFramePr>
+            <p:nvPr>
+              <p:extLst>
+                <p:ext uri="{D42A27DB-BD31-4B8C-83A1-F6EECF244321}">
+                  <p14:modId xmlns:p14="http://schemas.microsoft.com/office/powerpoint/2010/main" val="2610974291"/>
+                </p:ext>
+              </p:extLst>
+            </p:nvPr>
+          </p:nvGraphicFramePr>
+          <p:xfrm>
+            <a:off x="2414650" y="1651192"/>
+            <a:ext cx="495300" cy="276225"/>
+          </p:xfrm>
+          <a:graphic>
+            <a:graphicData uri="http://schemas.openxmlformats.org/presentationml/2006/ole">
+              <mc:AlternateContent xmlns:mc="http://schemas.openxmlformats.org/markup-compatibility/2006">
+                <mc:Choice xmlns:v="urn:schemas-microsoft-com:vml" Requires="v">
+                  <p:oleObj spid="_x0000_s1038" name="Bitmap Image" r:id="rId9" imgW="495893" imgH="275942" progId="PBrush">
+                    <p:embed/>
+                  </p:oleObj>
+                </mc:Choice>
+                <mc:Fallback>
+                  <p:oleObj name="Bitmap Image" r:id="rId9" imgW="495893" imgH="275942" progId="PBrush">
+                    <p:embed/>
+                    <p:pic>
+                      <p:nvPicPr>
+                        <p:cNvPr id="0" name=""/>
+                        <p:cNvPicPr/>
+                        <p:nvPr/>
+                      </p:nvPicPr>
+                      <p:blipFill>
+                        <a:blip r:embed="rId10"/>
+                        <a:stretch>
+                          <a:fillRect/>
+                        </a:stretch>
+                      </p:blipFill>
+                      <p:spPr>
+                        <a:xfrm>
+                          <a:off x="2414650" y="1651192"/>
+                          <a:ext cx="495300" cy="276225"/>
+                        </a:xfrm>
+                        <a:prstGeom prst="rect">
+                          <a:avLst/>
+                        </a:prstGeom>
+                      </p:spPr>
+                    </p:pic>
+                  </p:oleObj>
+                </mc:Fallback>
+              </mc:AlternateContent>
+            </a:graphicData>
+          </a:graphic>
+        </p:graphicFrame>
+        <p:pic>
+          <p:nvPicPr>
+            <p:cNvPr id="12" name="Imagen 11">
+              <a:extLst>
+                <a:ext uri="{FF2B5EF4-FFF2-40B4-BE49-F238E27FC236}">
+                  <a16:creationId xmlns:a16="http://schemas.microsoft.com/office/drawing/2014/main" id="{66EF73A7-B26B-4507-93B6-CB3E2DB421A2}"/>
+                </a:ext>
+              </a:extLst>
+            </p:cNvPr>
+            <p:cNvPicPr>
+              <a:picLocks noChangeAspect="1"/>
+            </p:cNvPicPr>
+            <p:nvPr/>
+          </p:nvPicPr>
+          <p:blipFill>
+            <a:blip r:embed="rId11"/>
+            <a:stretch>
+              <a:fillRect/>
+            </a:stretch>
+          </p:blipFill>
+          <p:spPr>
+            <a:xfrm>
+              <a:off x="4642831" y="5519762"/>
+              <a:ext cx="152421" cy="181000"/>
+            </a:xfrm>
+            <a:prstGeom prst="rect">
+              <a:avLst/>
+            </a:prstGeom>
+          </p:spPr>
+        </p:pic>
+      </p:grpSp>
+      <p:pic>
+        <p:nvPicPr>
+          <p:cNvPr id="13" name="Imagen 12">
+            <a:extLst>
+              <a:ext uri="{FF2B5EF4-FFF2-40B4-BE49-F238E27FC236}">
+                <a16:creationId xmlns:a16="http://schemas.microsoft.com/office/drawing/2014/main" id="{B79A6E16-2527-439A-95F4-F2D58B7814FF}"/>
+              </a:ext>
+            </a:extLst>
+          </p:cNvPr>
+          <p:cNvPicPr>
+            <a:picLocks noChangeAspect="1"/>
+          </p:cNvPicPr>
+          <p:nvPr/>
+        </p:nvPicPr>
+        <p:blipFill>
+          <a:blip r:embed="rId12"/>
+          <a:stretch>
+            <a:fillRect/>
+          </a:stretch>
+        </p:blipFill>
+        <p:spPr>
+          <a:xfrm>
+            <a:off x="9649065" y="5156202"/>
+            <a:ext cx="152421" cy="181000"/>
+          </a:xfrm>
+          <a:prstGeom prst="rect">
+            <a:avLst/>
+          </a:prstGeom>
+        </p:spPr>
+      </p:pic>
+      <p:pic>
+        <p:nvPicPr>
+          <p:cNvPr id="15" name="Imagen 14">
+            <a:extLst>
+              <a:ext uri="{FF2B5EF4-FFF2-40B4-BE49-F238E27FC236}">
+                <a16:creationId xmlns:a16="http://schemas.microsoft.com/office/drawing/2014/main" id="{F1DF5242-0050-430A-A3AF-9256A1EA2874}"/>
+              </a:ext>
+            </a:extLst>
+          </p:cNvPr>
+          <p:cNvPicPr>
+            <a:picLocks noChangeAspect="1"/>
+          </p:cNvPicPr>
+          <p:nvPr/>
+        </p:nvPicPr>
+        <p:blipFill>
+          <a:blip r:embed="rId13"/>
+          <a:stretch>
+            <a:fillRect/>
+          </a:stretch>
+        </p:blipFill>
+        <p:spPr>
+          <a:xfrm>
+            <a:off x="6922030" y="5691698"/>
+            <a:ext cx="2181529" cy="314369"/>
+          </a:xfrm>
+          <a:prstGeom prst="rect">
+            <a:avLst/>
+          </a:prstGeom>
+        </p:spPr>
+      </p:pic>
+      <p:pic>
+        <p:nvPicPr>
+          <p:cNvPr id="16" name="Imagen 15">
+            <a:extLst>
+              <a:ext uri="{FF2B5EF4-FFF2-40B4-BE49-F238E27FC236}">
+                <a16:creationId xmlns:a16="http://schemas.microsoft.com/office/drawing/2014/main" id="{FE52FB79-A79C-4839-B73E-1B024911CADD}"/>
+              </a:ext>
+            </a:extLst>
+          </p:cNvPr>
+          <p:cNvPicPr>
+            <a:picLocks noChangeAspect="1"/>
+          </p:cNvPicPr>
+          <p:nvPr/>
+        </p:nvPicPr>
+        <p:blipFill>
+          <a:blip r:embed="rId14"/>
+          <a:stretch>
+            <a:fillRect/>
+          </a:stretch>
+        </p:blipFill>
+        <p:spPr>
+          <a:xfrm>
+            <a:off x="6922030" y="6192948"/>
+            <a:ext cx="2324424" cy="323895"/>
+          </a:xfrm>
+          <a:prstGeom prst="rect">
+            <a:avLst/>
+          </a:prstGeom>
+        </p:spPr>
+      </p:pic>
+    </p:spTree>
+    <p:extLst>
+      <p:ext uri="{BB962C8B-B14F-4D97-AF65-F5344CB8AC3E}">
+        <p14:creationId xmlns:p14="http://schemas.microsoft.com/office/powerpoint/2010/main" val="3814116603"/>
+      </p:ext>
+    </p:extLst>
+  </p:cSld>
+  <p:clrMapOvr>
+    <a:masterClrMapping/>
+  </p:clrMapOvr>
+</p:sld>
+</file>
+
+<file path=ppt/slides/slide4.xml><?xml version="1.0" encoding="utf-8"?>
 <p:sld xmlns:a="http://schemas.openxmlformats.org/drawingml/2006/main" xmlns:r="http://schemas.openxmlformats.org/officeDocument/2006/relationships" xmlns:p="http://schemas.openxmlformats.org/presentationml/2006/main">
   <p:cSld>
     <p:spTree>
@@ -4579,7 +6413,7 @@
 </p:sld>
 </file>
 
-<file path=ppt/slides/slide4.xml><?xml version="1.0" encoding="utf-8"?>
+<file path=ppt/slides/slide5.xml><?xml version="1.0" encoding="utf-8"?>
 <p:sld xmlns:a="http://schemas.openxmlformats.org/drawingml/2006/main" xmlns:r="http://schemas.openxmlformats.org/officeDocument/2006/relationships" xmlns:p="http://schemas.openxmlformats.org/presentationml/2006/main">
   <p:cSld>
     <p:bg>
@@ -4669,7 +6503,7 @@
 </p:sld>
 </file>
 
-<file path=ppt/slides/slide5.xml><?xml version="1.0" encoding="utf-8"?>
+<file path=ppt/slides/slide6.xml><?xml version="1.0" encoding="utf-8"?>
 <p:sld xmlns:a="http://schemas.openxmlformats.org/drawingml/2006/main" xmlns:r="http://schemas.openxmlformats.org/officeDocument/2006/relationships" xmlns:p="http://schemas.openxmlformats.org/presentationml/2006/main">
   <p:cSld>
     <p:bg>
@@ -4759,7 +6593,7 @@
 </p:sld>
 </file>
 
-<file path=ppt/slides/slide6.xml><?xml version="1.0" encoding="utf-8"?>
+<file path=ppt/slides/slide7.xml><?xml version="1.0" encoding="utf-8"?>
 <p:sld xmlns:a="http://schemas.openxmlformats.org/drawingml/2006/main" xmlns:r="http://schemas.openxmlformats.org/officeDocument/2006/relationships" xmlns:p="http://schemas.openxmlformats.org/presentationml/2006/main">
   <p:cSld>
     <p:bg>
@@ -4849,7 +6683,7 @@
 </p:sld>
 </file>
 
-<file path=ppt/slides/slide7.xml><?xml version="1.0" encoding="utf-8"?>
+<file path=ppt/slides/slide8.xml><?xml version="1.0" encoding="utf-8"?>
 <p:sld xmlns:a="http://schemas.openxmlformats.org/drawingml/2006/main" xmlns:r="http://schemas.openxmlformats.org/officeDocument/2006/relationships" xmlns:p="http://schemas.openxmlformats.org/presentationml/2006/main">
   <p:cSld>
     <p:bg>
@@ -4939,7 +6773,7 @@
 </p:sld>
 </file>
 
-<file path=ppt/slides/slide8.xml><?xml version="1.0" encoding="utf-8"?>
+<file path=ppt/slides/slide9.xml><?xml version="1.0" encoding="utf-8"?>
 <p:sld xmlns:a="http://schemas.openxmlformats.org/drawingml/2006/main" xmlns:r="http://schemas.openxmlformats.org/officeDocument/2006/relationships" xmlns:p="http://schemas.openxmlformats.org/presentationml/2006/main">
   <p:cSld>
     <p:spTree>
@@ -4995,96 +6829,6 @@
   </p:cSld>
   <p:clrMapOvr>
     <a:masterClrMapping/>
-  </p:clrMapOvr>
-</p:sld>
-</file>
-
-<file path=ppt/slides/slide9.xml><?xml version="1.0" encoding="utf-8"?>
-<p:sld xmlns:a="http://schemas.openxmlformats.org/drawingml/2006/main" xmlns:r="http://schemas.openxmlformats.org/officeDocument/2006/relationships" xmlns:p="http://schemas.openxmlformats.org/presentationml/2006/main">
-  <p:cSld>
-    <p:bg>
-      <p:bgPr>
-        <a:gradFill flip="none" rotWithShape="1">
-          <a:gsLst>
-            <a:gs pos="0">
-              <a:schemeClr val="accent4">
-                <a:lumMod val="0"/>
-                <a:lumOff val="100000"/>
-              </a:schemeClr>
-            </a:gs>
-            <a:gs pos="35000">
-              <a:schemeClr val="accent4">
-                <a:lumMod val="0"/>
-                <a:lumOff val="100000"/>
-              </a:schemeClr>
-            </a:gs>
-            <a:gs pos="100000">
-              <a:schemeClr val="accent4">
-                <a:lumMod val="100000"/>
-              </a:schemeClr>
-            </a:gs>
-          </a:gsLst>
-          <a:path path="circle">
-            <a:fillToRect l="50000" t="-80000" r="50000" b="180000"/>
-          </a:path>
-          <a:tileRect/>
-        </a:gradFill>
-        <a:effectLst/>
-      </p:bgPr>
-    </p:bg>
-    <p:spTree>
-      <p:nvGrpSpPr>
-        <p:cNvPr id="1" name=""/>
-        <p:cNvGrpSpPr/>
-        <p:nvPr/>
-      </p:nvGrpSpPr>
-      <p:grpSpPr>
-        <a:xfrm>
-          <a:off x="0" y="0"/>
-          <a:ext cx="0" cy="0"/>
-          <a:chOff x="0" y="0"/>
-          <a:chExt cx="0" cy="0"/>
-        </a:xfrm>
-      </p:grpSpPr>
-      <p:pic>
-        <p:nvPicPr>
-          <p:cNvPr id="2" name="Imagen 1">
-            <a:extLst>
-              <a:ext uri="{FF2B5EF4-FFF2-40B4-BE49-F238E27FC236}">
-                <a16:creationId xmlns:a16="http://schemas.microsoft.com/office/drawing/2014/main" id="{7F38A179-1591-4BF0-B4D9-498F3C85FA32}"/>
-              </a:ext>
-            </a:extLst>
-          </p:cNvPr>
-          <p:cNvPicPr>
-            <a:picLocks noChangeAspect="1"/>
-          </p:cNvPicPr>
-          <p:nvPr/>
-        </p:nvPicPr>
-        <p:blipFill>
-          <a:blip r:embed="rId3"/>
-          <a:stretch>
-            <a:fillRect/>
-          </a:stretch>
-        </p:blipFill>
-        <p:spPr>
-          <a:xfrm>
-            <a:off x="1937757" y="1561839"/>
-            <a:ext cx="8316486" cy="3734321"/>
-          </a:xfrm>
-          <a:prstGeom prst="rect">
-            <a:avLst/>
-          </a:prstGeom>
-        </p:spPr>
-      </p:pic>
-    </p:spTree>
-    <p:extLst>
-      <p:ext uri="{BB962C8B-B14F-4D97-AF65-F5344CB8AC3E}">
-        <p14:creationId xmlns:p14="http://schemas.microsoft.com/office/powerpoint/2010/main" val="2670592745"/>
-      </p:ext>
-    </p:extLst>
-  </p:cSld>
-  <p:clrMapOvr>
-    <a:overrideClrMapping bg1="lt1" tx1="dk1" bg2="lt2" tx2="dk2" accent1="accent1" accent2="accent2" accent3="accent3" accent4="accent4" accent5="accent5" accent6="accent6" hlink="hlink" folHlink="folHlink"/>
   </p:clrMapOvr>
 </p:sld>
 </file>

</xml_diff>